<commit_message>
atualizado status e backlog
</commit_message>
<xml_diff>
--- a/Documentação/Status Report - Grupo 6 - 4o semestre.pptx
+++ b/Documentação/Status Report - Grupo 6 - 4o semestre.pptx
@@ -5,11 +5,12 @@
     <p:sldMasterId id="2147483680" r:id="rId1"/>
   </p:sldMasterIdLst>
   <p:notesMasterIdLst>
-    <p:notesMasterId r:id="rId4"/>
+    <p:notesMasterId r:id="rId5"/>
   </p:notesMasterIdLst>
   <p:sldIdLst>
     <p:sldId id="257" r:id="rId2"/>
     <p:sldId id="479" r:id="rId3"/>
+    <p:sldId id="480" r:id="rId4"/>
   </p:sldIdLst>
   <p:sldSz cx="12192000" cy="6858000"/>
   <p:notesSz cx="6858000" cy="9144000"/>
@@ -119,9 +120,46 @@
 <file path=ppt/revisionInfo.xml><?xml version="1.0" encoding="utf-8"?>
 <p1510:revInfo xmlns:a="http://schemas.openxmlformats.org/drawingml/2006/main" xmlns:r="http://schemas.openxmlformats.org/officeDocument/2006/relationships" xmlns:p1510="http://schemas.microsoft.com/office/powerpoint/2015/10/main">
   <p1510:revLst>
-    <p1510:client id="{41D98183-C116-49F3-AD1A-8C1F3520897F}" v="1" dt="2022-02-09T17:09:44.864"/>
+    <p1510:client id="{FC884D8F-8132-4797-8B37-E136C1AE05ED}" v="1" dt="2022-02-16T21:55:06.286"/>
   </p1510:revLst>
 </p1510:revInfo>
+</file>
+
+<file path=ppt/changesInfos/changesInfo1.xml><?xml version="1.0" encoding="utf-8"?>
+<pc:chgInfo xmlns:a="http://schemas.openxmlformats.org/drawingml/2006/main" xmlns:r="http://schemas.openxmlformats.org/officeDocument/2006/relationships" xmlns:ac="http://schemas.microsoft.com/office/drawing/2013/main/command" xmlns:pc="http://schemas.microsoft.com/office/powerpoint/2013/main/command">
+  <pc:docChgLst>
+    <pc:chgData name="Vinicius Cano" userId="849c3e71a5d7c7de" providerId="LiveId" clId="{FC884D8F-8132-4797-8B37-E136C1AE05ED}"/>
+    <pc:docChg chg="custSel addSld modSld">
+      <pc:chgData name="Vinicius Cano" userId="849c3e71a5d7c7de" providerId="LiveId" clId="{FC884D8F-8132-4797-8B37-E136C1AE05ED}" dt="2022-02-16T22:00:32.982" v="92" actId="313"/>
+      <pc:docMkLst>
+        <pc:docMk/>
+      </pc:docMkLst>
+      <pc:sldChg chg="modSp add mod">
+        <pc:chgData name="Vinicius Cano" userId="849c3e71a5d7c7de" providerId="LiveId" clId="{FC884D8F-8132-4797-8B37-E136C1AE05ED}" dt="2022-02-16T22:00:32.982" v="92" actId="313"/>
+        <pc:sldMkLst>
+          <pc:docMk/>
+          <pc:sldMk cId="1617750086" sldId="480"/>
+        </pc:sldMkLst>
+        <pc:spChg chg="mod">
+          <ac:chgData name="Vinicius Cano" userId="849c3e71a5d7c7de" providerId="LiveId" clId="{FC884D8F-8132-4797-8B37-E136C1AE05ED}" dt="2022-02-16T21:55:16.682" v="8" actId="20577"/>
+          <ac:spMkLst>
+            <pc:docMk/>
+            <pc:sldMk cId="1617750086" sldId="480"/>
+            <ac:spMk id="3" creationId="{00000000-0000-0000-0000-000000000000}"/>
+          </ac:spMkLst>
+        </pc:spChg>
+        <pc:spChg chg="mod">
+          <ac:chgData name="Vinicius Cano" userId="849c3e71a5d7c7de" providerId="LiveId" clId="{FC884D8F-8132-4797-8B37-E136C1AE05ED}" dt="2022-02-16T22:00:32.982" v="92" actId="313"/>
+          <ac:spMkLst>
+            <pc:docMk/>
+            <pc:sldMk cId="1617750086" sldId="480"/>
+            <ac:spMk id="63" creationId="{00000000-0000-0000-0000-000000000000}"/>
+          </ac:spMkLst>
+        </pc:spChg>
+      </pc:sldChg>
+    </pc:docChg>
+  </pc:docChgLst>
+</pc:chgInfo>
 </file>
 
 <file path=ppt/notesMasters/notesMaster1.xml><?xml version="1.0" encoding="utf-8"?>
@@ -206,7 +244,7 @@
           <a:p>
             <a:fld id="{61367353-8775-4759-AC6C-A14CC7E8356E}" type="datetimeFigureOut">
               <a:rPr lang="pt-BR" smtClean="0"/>
-              <a:t>09/02/2022</a:t>
+              <a:t>16/02/2022</a:t>
             </a:fld>
             <a:endParaRPr lang="pt-BR"/>
           </a:p>
@@ -557,6 +595,99 @@
     <p:extLst>
       <p:ext uri="{BB962C8B-B14F-4D97-AF65-F5344CB8AC3E}">
         <p14:creationId xmlns:p14="http://schemas.microsoft.com/office/powerpoint/2010/main" val="4274810473"/>
+      </p:ext>
+    </p:extLst>
+  </p:cSld>
+  <p:clrMapOvr>
+    <a:masterClrMapping/>
+  </p:clrMapOvr>
+</p:notes>
+</file>
+
+<file path=ppt/notesSlides/notesSlide2.xml><?xml version="1.0" encoding="utf-8"?>
+<p:notes xmlns:a="http://schemas.openxmlformats.org/drawingml/2006/main" xmlns:r="http://schemas.openxmlformats.org/officeDocument/2006/relationships" xmlns:p="http://schemas.openxmlformats.org/presentationml/2006/main">
+  <p:cSld>
+    <p:spTree>
+      <p:nvGrpSpPr>
+        <p:cNvPr id="1" name=""/>
+        <p:cNvGrpSpPr/>
+        <p:nvPr/>
+      </p:nvGrpSpPr>
+      <p:grpSpPr>
+        <a:xfrm>
+          <a:off x="0" y="0"/>
+          <a:ext cx="0" cy="0"/>
+          <a:chOff x="0" y="0"/>
+          <a:chExt cx="0" cy="0"/>
+        </a:xfrm>
+      </p:grpSpPr>
+      <p:sp>
+        <p:nvSpPr>
+          <p:cNvPr id="2" name="Slide Image Placeholder 1"/>
+          <p:cNvSpPr>
+            <a:spLocks noGrp="1" noRot="1" noChangeAspect="1"/>
+          </p:cNvSpPr>
+          <p:nvPr>
+            <p:ph type="sldImg"/>
+          </p:nvPr>
+        </p:nvSpPr>
+        <p:spPr/>
+      </p:sp>
+      <p:sp>
+        <p:nvSpPr>
+          <p:cNvPr id="3" name="Notes Placeholder 2"/>
+          <p:cNvSpPr>
+            <a:spLocks noGrp="1"/>
+          </p:cNvSpPr>
+          <p:nvPr>
+            <p:ph type="body" idx="1"/>
+          </p:nvPr>
+        </p:nvSpPr>
+        <p:spPr/>
+        <p:txBody>
+          <a:bodyPr/>
+          <a:lstStyle/>
+          <a:p>
+            <a:endParaRPr lang="en-US"/>
+          </a:p>
+        </p:txBody>
+      </p:sp>
+      <p:sp>
+        <p:nvSpPr>
+          <p:cNvPr id="4" name="Slide Number Placeholder 3"/>
+          <p:cNvSpPr>
+            <a:spLocks noGrp="1"/>
+          </p:cNvSpPr>
+          <p:nvPr>
+            <p:ph type="sldNum" sz="quarter" idx="10"/>
+          </p:nvPr>
+        </p:nvSpPr>
+        <p:spPr/>
+        <p:txBody>
+          <a:bodyPr/>
+          <a:lstStyle/>
+          <a:p>
+            <a:fld id="{B39AF3DB-B6A1-2444-9DD8-53D016F8E638}" type="slidenum">
+              <a:rPr lang="pt-BR" smtClean="0">
+                <a:solidFill>
+                  <a:prstClr val="black"/>
+                </a:solidFill>
+              </a:rPr>
+              <a:pPr/>
+              <a:t>3</a:t>
+            </a:fld>
+            <a:endParaRPr lang="pt-BR">
+              <a:solidFill>
+                <a:prstClr val="black"/>
+              </a:solidFill>
+            </a:endParaRPr>
+          </a:p>
+        </p:txBody>
+      </p:sp>
+    </p:spTree>
+    <p:extLst>
+      <p:ext uri="{BB962C8B-B14F-4D97-AF65-F5344CB8AC3E}">
+        <p14:creationId xmlns:p14="http://schemas.microsoft.com/office/powerpoint/2010/main" val="3531561715"/>
       </p:ext>
     </p:extLst>
   </p:cSld>
@@ -48268,6 +48399,1858 @@
 </p:sld>
 </file>
 
+<file path=ppt/slides/slide3.xml><?xml version="1.0" encoding="utf-8"?>
+<p:sld xmlns:a="http://schemas.openxmlformats.org/drawingml/2006/main" xmlns:r="http://schemas.openxmlformats.org/officeDocument/2006/relationships" xmlns:p="http://schemas.openxmlformats.org/presentationml/2006/main">
+  <p:cSld>
+    <p:spTree>
+      <p:nvGrpSpPr>
+        <p:cNvPr id="1" name=""/>
+        <p:cNvGrpSpPr/>
+        <p:nvPr/>
+      </p:nvGrpSpPr>
+      <p:grpSpPr>
+        <a:xfrm>
+          <a:off x="0" y="0"/>
+          <a:ext cx="0" cy="0"/>
+          <a:chOff x="0" y="0"/>
+          <a:chExt cx="0" cy="0"/>
+        </a:xfrm>
+      </p:grpSpPr>
+      <p:sp>
+        <p:nvSpPr>
+          <p:cNvPr id="43" name="Rectangle 42"/>
+          <p:cNvSpPr/>
+          <p:nvPr/>
+        </p:nvSpPr>
+        <p:spPr>
+          <a:xfrm>
+            <a:off x="6171647" y="1003710"/>
+            <a:ext cx="5631794" cy="2027749"/>
+          </a:xfrm>
+          <a:prstGeom prst="rect">
+            <a:avLst/>
+          </a:prstGeom>
+          <a:noFill/>
+          <a:ln w="12700">
+            <a:solidFill>
+              <a:schemeClr val="bg1">
+                <a:lumMod val="50000"/>
+              </a:schemeClr>
+            </a:solidFill>
+          </a:ln>
+        </p:spPr>
+        <p:style>
+          <a:lnRef idx="2">
+            <a:schemeClr val="accent4"/>
+          </a:lnRef>
+          <a:fillRef idx="1">
+            <a:schemeClr val="lt1"/>
+          </a:fillRef>
+          <a:effectRef idx="0">
+            <a:schemeClr val="accent4"/>
+          </a:effectRef>
+          <a:fontRef idx="minor">
+            <a:schemeClr val="dk1"/>
+          </a:fontRef>
+        </p:style>
+        <p:txBody>
+          <a:bodyPr tIns="95995" rtlCol="0" anchor="t"/>
+          <a:lstStyle/>
+          <a:p>
+            <a:pPr defTabSz="609555">
+              <a:spcAft>
+                <a:spcPts val="800"/>
+              </a:spcAft>
+            </a:pPr>
+            <a:endParaRPr lang="pt-BR" sz="1333" dirty="0">
+              <a:solidFill>
+                <a:schemeClr val="tx1"/>
+              </a:solidFill>
+              <a:latin typeface="Calibri" panose="020F0502020204030204" pitchFamily="34" charset="0"/>
+              <a:cs typeface="Simplon BP Regular"/>
+            </a:endParaRPr>
+          </a:p>
+        </p:txBody>
+      </p:sp>
+      <p:sp>
+        <p:nvSpPr>
+          <p:cNvPr id="3" name="Title 2"/>
+          <p:cNvSpPr>
+            <a:spLocks noGrp="1"/>
+          </p:cNvSpPr>
+          <p:nvPr>
+            <p:ph type="title"/>
+          </p:nvPr>
+        </p:nvSpPr>
+        <p:spPr>
+          <a:xfrm>
+            <a:off x="425984" y="168175"/>
+            <a:ext cx="10972224" cy="725874"/>
+          </a:xfrm>
+        </p:spPr>
+        <p:txBody>
+          <a:bodyPr vert="horz" wrap="square" lIns="95995" tIns="0" rIns="95995" bIns="0" numCol="1" anchor="t" anchorCtr="0" compatLnSpc="1">
+            <a:prstTxWarp prst="textNoShape">
+              <a:avLst/>
+            </a:prstTxWarp>
+            <a:noAutofit/>
+          </a:bodyPr>
+          <a:lstStyle/>
+          <a:p>
+            <a:pPr>
+              <a:spcAft>
+                <a:spcPts val="800"/>
+              </a:spcAft>
+            </a:pPr>
+            <a:r>
+              <a:rPr lang="en-US" sz="2400" dirty="0">
+                <a:solidFill>
+                  <a:prstClr val="black"/>
+                </a:solidFill>
+                <a:latin typeface="Simplon Oi Headline"/>
+                <a:cs typeface="Simplon Oi Headline"/>
+              </a:rPr>
+              <a:t>SEMANA 2 – 16/02/2022</a:t>
+            </a:r>
+          </a:p>
+        </p:txBody>
+      </p:sp>
+      <p:sp>
+        <p:nvSpPr>
+          <p:cNvPr id="64" name="Retângulo 63"/>
+          <p:cNvSpPr/>
+          <p:nvPr/>
+        </p:nvSpPr>
+        <p:spPr>
+          <a:xfrm>
+            <a:off x="465050" y="787720"/>
+            <a:ext cx="5610906" cy="215989"/>
+          </a:xfrm>
+          <a:prstGeom prst="rect">
+            <a:avLst/>
+          </a:prstGeom>
+          <a:solidFill>
+            <a:schemeClr val="bg1">
+              <a:lumMod val="85000"/>
+            </a:schemeClr>
+          </a:solidFill>
+        </p:spPr>
+        <p:txBody>
+          <a:bodyPr vert="horz" lIns="121913" tIns="60957" rIns="121913" bIns="60957" rtlCol="0" anchor="ctr"/>
+          <a:lstStyle/>
+          <a:p>
+            <a:pPr defTabSz="609555"/>
+            <a:r>
+              <a:rPr lang="en-US" sz="1400" dirty="0">
+                <a:latin typeface="Simplon Oi Headline" charset="0"/>
+                <a:ea typeface="Simplon Oi Headline" charset="0"/>
+                <a:cs typeface="Simplon Oi Headline" charset="0"/>
+              </a:rPr>
+              <a:t>PROGRESSOS</a:t>
+            </a:r>
+            <a:endParaRPr lang="pt-BR" sz="1400" dirty="0">
+              <a:latin typeface="Simplon Oi Headline" charset="0"/>
+              <a:ea typeface="Simplon Oi Headline" charset="0"/>
+              <a:cs typeface="Simplon Oi Headline" charset="0"/>
+            </a:endParaRPr>
+          </a:p>
+        </p:txBody>
+      </p:sp>
+      <p:sp>
+        <p:nvSpPr>
+          <p:cNvPr id="65" name="Retângulo 64"/>
+          <p:cNvSpPr/>
+          <p:nvPr/>
+        </p:nvSpPr>
+        <p:spPr>
+          <a:xfrm>
+            <a:off x="6180438" y="787720"/>
+            <a:ext cx="5618258" cy="215989"/>
+          </a:xfrm>
+          <a:prstGeom prst="rect">
+            <a:avLst/>
+          </a:prstGeom>
+          <a:solidFill>
+            <a:schemeClr val="bg1">
+              <a:lumMod val="85000"/>
+            </a:schemeClr>
+          </a:solidFill>
+        </p:spPr>
+        <p:txBody>
+          <a:bodyPr vert="horz" lIns="121913" tIns="60957" rIns="121913" bIns="60957" rtlCol="0" anchor="ctr"/>
+          <a:lstStyle/>
+          <a:p>
+            <a:pPr defTabSz="609555"/>
+            <a:r>
+              <a:rPr lang="pt-BR" sz="1400" dirty="0">
+                <a:latin typeface="Simplon Oi Headline" charset="0"/>
+                <a:ea typeface="Simplon Oi Headline" charset="0"/>
+                <a:cs typeface="Simplon Oi Headline" charset="0"/>
+              </a:rPr>
+              <a:t>Pontos atenção/ Principais Riscos</a:t>
+            </a:r>
+          </a:p>
+        </p:txBody>
+      </p:sp>
+      <p:sp>
+        <p:nvSpPr>
+          <p:cNvPr id="66" name="Retângulo 65"/>
+          <p:cNvSpPr/>
+          <p:nvPr/>
+        </p:nvSpPr>
+        <p:spPr>
+          <a:xfrm>
+            <a:off x="460307" y="3100907"/>
+            <a:ext cx="11341805" cy="215989"/>
+          </a:xfrm>
+          <a:prstGeom prst="rect">
+            <a:avLst/>
+          </a:prstGeom>
+          <a:solidFill>
+            <a:schemeClr val="bg1">
+              <a:lumMod val="85000"/>
+            </a:schemeClr>
+          </a:solidFill>
+        </p:spPr>
+        <p:txBody>
+          <a:bodyPr vert="horz" lIns="121913" tIns="60957" rIns="121913" bIns="60957" rtlCol="0" anchor="ctr"/>
+          <a:lstStyle/>
+          <a:p>
+            <a:pPr defTabSz="609555"/>
+            <a:r>
+              <a:rPr lang="pt-BR" sz="1400" dirty="0">
+                <a:latin typeface="Simplon Oi Headline" charset="0"/>
+                <a:ea typeface="Simplon Oi Headline" charset="0"/>
+                <a:cs typeface="Simplon Oi Headline" charset="0"/>
+              </a:rPr>
+              <a:t>Próximos Passos/ Decisões a tomar</a:t>
+            </a:r>
+          </a:p>
+        </p:txBody>
+      </p:sp>
+      <p:sp>
+        <p:nvSpPr>
+          <p:cNvPr id="63" name="Rectangle 37"/>
+          <p:cNvSpPr/>
+          <p:nvPr/>
+        </p:nvSpPr>
+        <p:spPr>
+          <a:xfrm>
+            <a:off x="450538" y="1003710"/>
+            <a:ext cx="5630105" cy="2027749"/>
+          </a:xfrm>
+          <a:prstGeom prst="rect">
+            <a:avLst/>
+          </a:prstGeom>
+          <a:noFill/>
+          <a:ln w="12700">
+            <a:solidFill>
+              <a:schemeClr val="bg1">
+                <a:lumMod val="50000"/>
+              </a:schemeClr>
+            </a:solidFill>
+          </a:ln>
+        </p:spPr>
+        <p:style>
+          <a:lnRef idx="2">
+            <a:schemeClr val="accent4"/>
+          </a:lnRef>
+          <a:fillRef idx="1">
+            <a:schemeClr val="lt1"/>
+          </a:fillRef>
+          <a:effectRef idx="0">
+            <a:schemeClr val="accent4"/>
+          </a:effectRef>
+          <a:fontRef idx="minor">
+            <a:schemeClr val="dk1"/>
+          </a:fontRef>
+        </p:style>
+        <p:txBody>
+          <a:bodyPr tIns="95995" rtlCol="0" anchor="t"/>
+          <a:lstStyle/>
+          <a:p>
+            <a:pPr marL="228583" indent="-228583" fontAlgn="base">
+              <a:spcBef>
+                <a:spcPct val="0"/>
+              </a:spcBef>
+              <a:buFont typeface="Wingdings" panose="05000000000000000000" pitchFamily="2" charset="2"/>
+              <a:buChar char="ü"/>
+              <a:defRPr/>
+            </a:pPr>
+            <a:r>
+              <a:rPr lang="pt-BR" sz="1197" b="1" dirty="0"/>
+              <a:t>Mapa de Persona</a:t>
+            </a:r>
+          </a:p>
+          <a:p>
+            <a:pPr marL="228583" indent="-228583" fontAlgn="base">
+              <a:spcBef>
+                <a:spcPct val="0"/>
+              </a:spcBef>
+              <a:buFont typeface="Wingdings" panose="05000000000000000000" pitchFamily="2" charset="2"/>
+              <a:buChar char="ü"/>
+              <a:defRPr/>
+            </a:pPr>
+            <a:r>
+              <a:rPr lang="pt-BR" sz="1197" b="1" dirty="0"/>
+              <a:t>Análise da Concorrência</a:t>
+            </a:r>
+          </a:p>
+          <a:p>
+            <a:pPr marL="228583" indent="-228583" fontAlgn="base">
+              <a:spcBef>
+                <a:spcPct val="0"/>
+              </a:spcBef>
+              <a:buFont typeface="Wingdings" panose="05000000000000000000" pitchFamily="2" charset="2"/>
+              <a:buChar char="ü"/>
+              <a:defRPr/>
+            </a:pPr>
+            <a:r>
+              <a:rPr lang="pt-BR" sz="1197" b="1" dirty="0"/>
+              <a:t>Contextualização</a:t>
+            </a:r>
+          </a:p>
+          <a:p>
+            <a:pPr marL="228583" indent="-228583" fontAlgn="base">
+              <a:spcBef>
+                <a:spcPct val="0"/>
+              </a:spcBef>
+              <a:buFont typeface="Wingdings" panose="05000000000000000000" pitchFamily="2" charset="2"/>
+              <a:buChar char="ü"/>
+              <a:defRPr/>
+            </a:pPr>
+            <a:r>
+              <a:rPr lang="pt-BR" sz="1197" b="1" dirty="0"/>
+              <a:t>Missão</a:t>
+            </a:r>
+          </a:p>
+          <a:p>
+            <a:pPr marL="228583" indent="-228583" fontAlgn="base">
+              <a:spcBef>
+                <a:spcPct val="0"/>
+              </a:spcBef>
+              <a:buFont typeface="Wingdings" panose="05000000000000000000" pitchFamily="2" charset="2"/>
+              <a:buChar char="ü"/>
+              <a:defRPr/>
+            </a:pPr>
+            <a:r>
+              <a:rPr lang="pt-BR" sz="1197" b="1" dirty="0"/>
+              <a:t>Visão</a:t>
+            </a:r>
+          </a:p>
+          <a:p>
+            <a:pPr marL="228583" indent="-228583" fontAlgn="base">
+              <a:spcBef>
+                <a:spcPct val="0"/>
+              </a:spcBef>
+              <a:buFont typeface="Wingdings" panose="05000000000000000000" pitchFamily="2" charset="2"/>
+              <a:buChar char="ü"/>
+              <a:defRPr/>
+            </a:pPr>
+            <a:r>
+              <a:rPr lang="pt-BR" sz="1197" b="1" dirty="0"/>
+              <a:t>Valores</a:t>
+            </a:r>
+          </a:p>
+          <a:p>
+            <a:pPr marL="228583" indent="-228583" fontAlgn="base">
+              <a:spcBef>
+                <a:spcPct val="0"/>
+              </a:spcBef>
+              <a:buFont typeface="Wingdings" panose="05000000000000000000" pitchFamily="2" charset="2"/>
+              <a:buChar char="ü"/>
+              <a:defRPr/>
+            </a:pPr>
+            <a:endParaRPr lang="pt-BR" sz="1197" b="1" dirty="0"/>
+          </a:p>
+          <a:p>
+            <a:pPr marL="228583" indent="-228583" fontAlgn="base">
+              <a:spcBef>
+                <a:spcPct val="0"/>
+              </a:spcBef>
+              <a:buFont typeface="Wingdings" panose="05000000000000000000" pitchFamily="2" charset="2"/>
+              <a:buChar char="ü"/>
+              <a:defRPr/>
+            </a:pPr>
+            <a:endParaRPr lang="pt-BR" sz="1197" b="1" dirty="0"/>
+          </a:p>
+          <a:p>
+            <a:pPr marL="228583" indent="-228583" fontAlgn="base">
+              <a:spcBef>
+                <a:spcPct val="0"/>
+              </a:spcBef>
+              <a:buFont typeface="Wingdings" panose="05000000000000000000" pitchFamily="2" charset="2"/>
+              <a:buChar char="ü"/>
+              <a:defRPr/>
+            </a:pPr>
+            <a:endParaRPr lang="pt-BR" sz="1197" b="1" dirty="0"/>
+          </a:p>
+          <a:p>
+            <a:pPr marL="228583" indent="-228583" fontAlgn="base">
+              <a:spcBef>
+                <a:spcPct val="0"/>
+              </a:spcBef>
+              <a:buFont typeface="Wingdings" panose="05000000000000000000" pitchFamily="2" charset="2"/>
+              <a:buChar char="ü"/>
+              <a:defRPr/>
+            </a:pPr>
+            <a:endParaRPr lang="pt-BR" sz="1197" b="1" dirty="0"/>
+          </a:p>
+          <a:p>
+            <a:pPr marL="228583" indent="-228583" fontAlgn="base">
+              <a:spcBef>
+                <a:spcPct val="0"/>
+              </a:spcBef>
+              <a:buFont typeface="Wingdings" panose="05000000000000000000" pitchFamily="2" charset="2"/>
+              <a:buChar char="ü"/>
+              <a:defRPr/>
+            </a:pPr>
+            <a:endParaRPr lang="pt-BR" sz="1197" b="1" dirty="0"/>
+          </a:p>
+          <a:p>
+            <a:pPr marL="228583" indent="-228583" fontAlgn="base">
+              <a:spcBef>
+                <a:spcPct val="0"/>
+              </a:spcBef>
+              <a:buFont typeface="Wingdings" panose="05000000000000000000" pitchFamily="2" charset="2"/>
+              <a:buChar char="ü"/>
+              <a:defRPr/>
+            </a:pPr>
+            <a:endParaRPr lang="pt-BR" sz="1200" b="1" dirty="0">
+              <a:solidFill>
+                <a:schemeClr val="tx1"/>
+              </a:solidFill>
+              <a:latin typeface="Calibri" panose="020F0502020204030204" pitchFamily="34" charset="0"/>
+              <a:cs typeface="Simplon BP Regular"/>
+            </a:endParaRPr>
+          </a:p>
+          <a:p>
+            <a:pPr marL="228583" indent="-228583" fontAlgn="base">
+              <a:spcBef>
+                <a:spcPct val="0"/>
+              </a:spcBef>
+              <a:buFont typeface="Wingdings" panose="05000000000000000000" pitchFamily="2" charset="2"/>
+              <a:buChar char="ü"/>
+              <a:defRPr/>
+            </a:pPr>
+            <a:endParaRPr lang="pt-BR" sz="1200" b="1" dirty="0">
+              <a:solidFill>
+                <a:schemeClr val="tx1"/>
+              </a:solidFill>
+              <a:latin typeface="Calibri" panose="020F0502020204030204" pitchFamily="34" charset="0"/>
+              <a:cs typeface="Simplon BP Regular"/>
+            </a:endParaRPr>
+          </a:p>
+          <a:p>
+            <a:pPr fontAlgn="base">
+              <a:spcBef>
+                <a:spcPct val="0"/>
+              </a:spcBef>
+              <a:defRPr/>
+            </a:pPr>
+            <a:endParaRPr lang="pt-BR" sz="1200" b="1" dirty="0">
+              <a:solidFill>
+                <a:schemeClr val="tx1"/>
+              </a:solidFill>
+              <a:latin typeface="Calibri" panose="020F0502020204030204" pitchFamily="34" charset="0"/>
+              <a:cs typeface="Simplon BP Regular"/>
+            </a:endParaRPr>
+          </a:p>
+          <a:p>
+            <a:pPr marL="228583" lvl="1" indent="-228583" fontAlgn="base">
+              <a:spcBef>
+                <a:spcPct val="0"/>
+              </a:spcBef>
+              <a:buFont typeface="Wingdings" panose="05000000000000000000" pitchFamily="2" charset="2"/>
+              <a:buChar char="ü"/>
+              <a:defRPr/>
+            </a:pPr>
+            <a:endParaRPr lang="pt-BR" sz="1200" b="1" dirty="0">
+              <a:solidFill>
+                <a:schemeClr val="tx1"/>
+              </a:solidFill>
+              <a:latin typeface="Calibri" panose="020F0502020204030204" pitchFamily="34" charset="0"/>
+              <a:cs typeface="Simplon BP Regular"/>
+            </a:endParaRPr>
+          </a:p>
+          <a:p>
+            <a:pPr marL="228583" indent="-228583" fontAlgn="base">
+              <a:spcBef>
+                <a:spcPct val="0"/>
+              </a:spcBef>
+              <a:buFont typeface="Wingdings" panose="05000000000000000000" pitchFamily="2" charset="2"/>
+              <a:buChar char="ü"/>
+              <a:defRPr/>
+            </a:pPr>
+            <a:endParaRPr lang="pt-BR" sz="1200" b="1" dirty="0">
+              <a:solidFill>
+                <a:schemeClr val="tx1"/>
+              </a:solidFill>
+              <a:latin typeface="Calibri" panose="020F0502020204030204" pitchFamily="34" charset="0"/>
+              <a:cs typeface="Simplon BP Regular"/>
+            </a:endParaRPr>
+          </a:p>
+          <a:p>
+            <a:pPr marL="228583" indent="-228583" fontAlgn="base">
+              <a:spcBef>
+                <a:spcPct val="0"/>
+              </a:spcBef>
+              <a:buFont typeface="Wingdings" panose="05000000000000000000" pitchFamily="2" charset="2"/>
+              <a:buChar char="ü"/>
+              <a:defRPr/>
+            </a:pPr>
+            <a:endParaRPr lang="pt-BR" sz="1200" b="1" dirty="0">
+              <a:solidFill>
+                <a:schemeClr val="tx1"/>
+              </a:solidFill>
+              <a:latin typeface="Calibri" panose="020F0502020204030204" pitchFamily="34" charset="0"/>
+              <a:cs typeface="Simplon BP Regular"/>
+            </a:endParaRPr>
+          </a:p>
+        </p:txBody>
+      </p:sp>
+      <p:sp>
+        <p:nvSpPr>
+          <p:cNvPr id="2" name="Rectangle 43">
+            <a:extLst>
+              <a:ext uri="{FF2B5EF4-FFF2-40B4-BE49-F238E27FC236}">
+                <a16:creationId xmlns:a16="http://schemas.microsoft.com/office/drawing/2014/main" id="{B15BA19F-C787-4E6A-ADAB-C0DFF09C66A8}"/>
+              </a:ext>
+            </a:extLst>
+          </p:cNvPr>
+          <p:cNvSpPr>
+            <a:spLocks/>
+          </p:cNvSpPr>
+          <p:nvPr/>
+        </p:nvSpPr>
+        <p:spPr>
+          <a:xfrm>
+            <a:off x="465050" y="3381452"/>
+            <a:ext cx="11333645" cy="3248206"/>
+          </a:xfrm>
+          <a:prstGeom prst="rect">
+            <a:avLst/>
+          </a:prstGeom>
+          <a:noFill/>
+          <a:ln w="12700">
+            <a:solidFill>
+              <a:schemeClr val="bg1">
+                <a:lumMod val="50000"/>
+              </a:schemeClr>
+            </a:solidFill>
+          </a:ln>
+        </p:spPr>
+        <p:style>
+          <a:lnRef idx="2">
+            <a:schemeClr val="accent4"/>
+          </a:lnRef>
+          <a:fillRef idx="1">
+            <a:schemeClr val="lt1"/>
+          </a:fillRef>
+          <a:effectRef idx="0">
+            <a:schemeClr val="accent4"/>
+          </a:effectRef>
+          <a:fontRef idx="minor">
+            <a:schemeClr val="dk1"/>
+          </a:fontRef>
+        </p:style>
+        <p:txBody>
+          <a:bodyPr wrap="square" tIns="95995" numCol="3" rtlCol="0" anchor="ctr"/>
+          <a:lstStyle/>
+          <a:p>
+            <a:pPr marL="0" lvl="1" defTabSz="609555"/>
+            <a:r>
+              <a:rPr lang="pt-BR" sz="1200" b="1" dirty="0">
+                <a:solidFill>
+                  <a:schemeClr val="tx1"/>
+                </a:solidFill>
+                <a:latin typeface="Calibri" panose="020F0502020204030204" pitchFamily="34" charset="0"/>
+                <a:cs typeface="Simplon BP Regular"/>
+              </a:rPr>
+              <a:t>Frente Plataforma</a:t>
+            </a:r>
+          </a:p>
+          <a:p>
+            <a:pPr marL="259147" lvl="1" indent="-259147" defTabSz="609555">
+              <a:buFont typeface="Arial" panose="020B0604020202020204" pitchFamily="34" charset="0"/>
+              <a:buChar char="•"/>
+            </a:pPr>
+            <a:endParaRPr lang="pt-BR" sz="1200" b="1" dirty="0">
+              <a:solidFill>
+                <a:schemeClr val="tx1"/>
+              </a:solidFill>
+              <a:latin typeface="Calibri" panose="020F0502020204030204" pitchFamily="34" charset="0"/>
+              <a:cs typeface="Simplon BP Regular"/>
+            </a:endParaRPr>
+          </a:p>
+          <a:p>
+            <a:pPr marL="0" lvl="1" defTabSz="609555"/>
+            <a:r>
+              <a:rPr lang="pt-BR" sz="1200" b="1" dirty="0">
+                <a:solidFill>
+                  <a:schemeClr val="tx1"/>
+                </a:solidFill>
+                <a:latin typeface="Calibri" panose="020F0502020204030204" pitchFamily="34" charset="0"/>
+                <a:cs typeface="Simplon BP Regular"/>
+              </a:rPr>
+              <a:t>Frente Back End</a:t>
+            </a:r>
+          </a:p>
+          <a:p>
+            <a:pPr marL="259147" lvl="1" indent="-259147" defTabSz="609555">
+              <a:buFont typeface="Arial" panose="020B0604020202020204" pitchFamily="34" charset="0"/>
+              <a:buChar char="•"/>
+            </a:pPr>
+            <a:endParaRPr lang="pt-BR" sz="1200" dirty="0">
+              <a:solidFill>
+                <a:schemeClr val="tx1"/>
+              </a:solidFill>
+              <a:latin typeface="Calibri" panose="020F0502020204030204" pitchFamily="34" charset="0"/>
+              <a:cs typeface="Simplon BP Regular"/>
+            </a:endParaRPr>
+          </a:p>
+          <a:p>
+            <a:pPr marL="0" lvl="1" defTabSz="609555"/>
+            <a:r>
+              <a:rPr lang="pt-BR" sz="1200" b="1" dirty="0">
+                <a:solidFill>
+                  <a:schemeClr val="tx1"/>
+                </a:solidFill>
+                <a:latin typeface="Calibri" panose="020F0502020204030204" pitchFamily="34" charset="0"/>
+                <a:cs typeface="Simplon BP Regular"/>
+              </a:rPr>
+              <a:t>Frente Front End</a:t>
+            </a:r>
+          </a:p>
+          <a:p>
+            <a:pPr marL="259147" lvl="1" indent="-259147" defTabSz="609555">
+              <a:buFont typeface="Arial" panose="020B0604020202020204" pitchFamily="34" charset="0"/>
+              <a:buChar char="•"/>
+            </a:pPr>
+            <a:endParaRPr lang="pt-BR" sz="1197" b="1" dirty="0">
+              <a:solidFill>
+                <a:schemeClr val="tx1"/>
+              </a:solidFill>
+              <a:latin typeface="Calibri" panose="020F0502020204030204" pitchFamily="34" charset="0"/>
+              <a:cs typeface="Simplon BP Regular"/>
+            </a:endParaRPr>
+          </a:p>
+          <a:p>
+            <a:pPr marL="0" lvl="1" defTabSz="609555"/>
+            <a:r>
+              <a:rPr lang="pt-BR" sz="1197" b="1" dirty="0">
+                <a:solidFill>
+                  <a:schemeClr val="tx1"/>
+                </a:solidFill>
+                <a:latin typeface="Calibri" panose="020F0502020204030204" pitchFamily="34" charset="0"/>
+                <a:cs typeface="Simplon BP Regular"/>
+              </a:rPr>
+              <a:t>Frente Negócios</a:t>
+            </a:r>
+          </a:p>
+          <a:p>
+            <a:pPr marL="259147" lvl="1" indent="-259147">
+              <a:buFont typeface="Arial" panose="020B0604020202020204" pitchFamily="34" charset="0"/>
+              <a:buChar char="•"/>
+            </a:pPr>
+            <a:r>
+              <a:rPr lang="pt-BR" sz="1197" dirty="0">
+                <a:solidFill>
+                  <a:schemeClr val="tx1"/>
+                </a:solidFill>
+                <a:latin typeface="Calibri" panose="020F0502020204030204" pitchFamily="34" charset="0"/>
+                <a:cs typeface="Simplon BP Regular"/>
+              </a:rPr>
+              <a:t>Arquitetura da solução</a:t>
+            </a:r>
+          </a:p>
+          <a:p>
+            <a:pPr marL="259147" lvl="1" indent="-259147">
+              <a:buFont typeface="Arial" panose="020B0604020202020204" pitchFamily="34" charset="0"/>
+              <a:buChar char="•"/>
+            </a:pPr>
+            <a:r>
+              <a:rPr lang="pt-BR" sz="1197" dirty="0">
+                <a:solidFill>
+                  <a:schemeClr val="tx1"/>
+                </a:solidFill>
+                <a:latin typeface="Calibri" panose="020F0502020204030204" pitchFamily="34" charset="0"/>
+                <a:cs typeface="Simplon BP Regular"/>
+              </a:rPr>
+              <a:t>Modelagem de dados</a:t>
+            </a:r>
+          </a:p>
+          <a:p>
+            <a:pPr marL="259147" lvl="1" indent="-259147">
+              <a:buFont typeface="Arial" panose="020B0604020202020204" pitchFamily="34" charset="0"/>
+              <a:buChar char="•"/>
+            </a:pPr>
+            <a:r>
+              <a:rPr lang="pt-BR" sz="1197" dirty="0">
+                <a:solidFill>
+                  <a:schemeClr val="tx1"/>
+                </a:solidFill>
+                <a:latin typeface="Calibri" panose="020F0502020204030204" pitchFamily="34" charset="0"/>
+                <a:cs typeface="Simplon BP Regular"/>
+              </a:rPr>
+              <a:t>Jornada do usuário</a:t>
+            </a:r>
+          </a:p>
+          <a:p>
+            <a:pPr marL="259147" lvl="1" indent="-259147">
+              <a:buFont typeface="Arial" panose="020B0604020202020204" pitchFamily="34" charset="0"/>
+              <a:buChar char="•"/>
+            </a:pPr>
+            <a:r>
+              <a:rPr lang="pt-BR" sz="1197" dirty="0">
+                <a:solidFill>
+                  <a:schemeClr val="tx1"/>
+                </a:solidFill>
+                <a:latin typeface="Calibri" panose="020F0502020204030204" pitchFamily="34" charset="0"/>
+                <a:cs typeface="Simplon BP Regular"/>
+              </a:rPr>
+              <a:t>Mapa de persona</a:t>
+            </a:r>
+          </a:p>
+          <a:p>
+            <a:pPr marL="259147" lvl="1" indent="-259147">
+              <a:buFont typeface="Arial" panose="020B0604020202020204" pitchFamily="34" charset="0"/>
+              <a:buChar char="•"/>
+            </a:pPr>
+            <a:r>
+              <a:rPr lang="pt-BR" sz="1197" dirty="0">
+                <a:latin typeface="+mj-lt"/>
+                <a:cs typeface="Arial" panose="020B0604020202020204" pitchFamily="34" charset="0"/>
+              </a:rPr>
+              <a:t>Diferencial do negócio em relação à concorrência</a:t>
+            </a:r>
+            <a:endParaRPr lang="pt-BR" sz="1197" dirty="0">
+              <a:solidFill>
+                <a:schemeClr val="tx1"/>
+              </a:solidFill>
+              <a:latin typeface="+mj-lt"/>
+              <a:cs typeface="Simplon BP Regular"/>
+            </a:endParaRPr>
+          </a:p>
+        </p:txBody>
+      </p:sp>
+      <p:sp>
+        <p:nvSpPr>
+          <p:cNvPr id="44" name="TextBox 118">
+            <a:extLst>
+              <a:ext uri="{FF2B5EF4-FFF2-40B4-BE49-F238E27FC236}">
+                <a16:creationId xmlns:a16="http://schemas.microsoft.com/office/drawing/2014/main" id="{1E997FEB-A82C-4FE3-B191-DE926FE907FC}"/>
+              </a:ext>
+            </a:extLst>
+          </p:cNvPr>
+          <p:cNvSpPr txBox="1"/>
+          <p:nvPr/>
+        </p:nvSpPr>
+        <p:spPr>
+          <a:xfrm>
+            <a:off x="10731740" y="574016"/>
+            <a:ext cx="815957" cy="163090"/>
+          </a:xfrm>
+          <a:prstGeom prst="rect">
+            <a:avLst/>
+          </a:prstGeom>
+          <a:noFill/>
+          <a:ln w="12700">
+            <a:noFill/>
+          </a:ln>
+        </p:spPr>
+        <p:style>
+          <a:lnRef idx="2">
+            <a:schemeClr val="accent4"/>
+          </a:lnRef>
+          <a:fillRef idx="1">
+            <a:schemeClr val="lt1"/>
+          </a:fillRef>
+          <a:effectRef idx="0">
+            <a:schemeClr val="accent4"/>
+          </a:effectRef>
+          <a:fontRef idx="minor">
+            <a:schemeClr val="dk1"/>
+          </a:fontRef>
+        </p:style>
+        <p:txBody>
+          <a:bodyPr wrap="none" lIns="47997" tIns="47997" rIns="47997" bIns="0" rtlCol="0" anchor="b"/>
+          <a:lstStyle>
+            <a:defPPr>
+              <a:defRPr lang="en-US"/>
+            </a:defPPr>
+            <a:lvl1pPr algn="ctr">
+              <a:defRPr sz="1000" b="1">
+                <a:latin typeface="Simplon BP Regular"/>
+                <a:cs typeface="Simplon BP Regular"/>
+              </a:defRPr>
+            </a:lvl1pPr>
+            <a:lvl2pPr>
+              <a:defRPr>
+                <a:solidFill>
+                  <a:schemeClr val="dk1"/>
+                </a:solidFill>
+              </a:defRPr>
+            </a:lvl2pPr>
+            <a:lvl3pPr>
+              <a:defRPr>
+                <a:solidFill>
+                  <a:schemeClr val="dk1"/>
+                </a:solidFill>
+              </a:defRPr>
+            </a:lvl3pPr>
+            <a:lvl4pPr>
+              <a:defRPr>
+                <a:solidFill>
+                  <a:schemeClr val="dk1"/>
+                </a:solidFill>
+              </a:defRPr>
+            </a:lvl4pPr>
+            <a:lvl5pPr>
+              <a:defRPr>
+                <a:solidFill>
+                  <a:schemeClr val="dk1"/>
+                </a:solidFill>
+              </a:defRPr>
+            </a:lvl5pPr>
+            <a:lvl6pPr>
+              <a:defRPr>
+                <a:solidFill>
+                  <a:schemeClr val="dk1"/>
+                </a:solidFill>
+              </a:defRPr>
+            </a:lvl6pPr>
+            <a:lvl7pPr>
+              <a:defRPr>
+                <a:solidFill>
+                  <a:schemeClr val="dk1"/>
+                </a:solidFill>
+              </a:defRPr>
+            </a:lvl7pPr>
+            <a:lvl8pPr>
+              <a:defRPr>
+                <a:solidFill>
+                  <a:schemeClr val="dk1"/>
+                </a:solidFill>
+              </a:defRPr>
+            </a:lvl8pPr>
+            <a:lvl9pPr>
+              <a:defRPr>
+                <a:solidFill>
+                  <a:schemeClr val="dk1"/>
+                </a:solidFill>
+              </a:defRPr>
+            </a:lvl9pPr>
+          </a:lstStyle>
+          <a:p>
+            <a:pPr defTabSz="609555"/>
+            <a:r>
+              <a:rPr lang="pt-BR" sz="1067" b="0" dirty="0">
+                <a:solidFill>
+                  <a:prstClr val="black"/>
+                </a:solidFill>
+                <a:latin typeface="Simplon BP Bold" pitchFamily="2" charset="0"/>
+              </a:rPr>
+              <a:t>Negócios</a:t>
+            </a:r>
+          </a:p>
+        </p:txBody>
+      </p:sp>
+      <p:sp>
+        <p:nvSpPr>
+          <p:cNvPr id="45" name="Oval 120">
+            <a:extLst>
+              <a:ext uri="{FF2B5EF4-FFF2-40B4-BE49-F238E27FC236}">
+                <a16:creationId xmlns:a16="http://schemas.microsoft.com/office/drawing/2014/main" id="{086246F5-DDAA-4D0C-90E1-F0C0FED6D98E}"/>
+              </a:ext>
+            </a:extLst>
+          </p:cNvPr>
+          <p:cNvSpPr>
+            <a:spLocks noChangeAspect="1"/>
+          </p:cNvSpPr>
+          <p:nvPr/>
+        </p:nvSpPr>
+        <p:spPr>
+          <a:xfrm>
+            <a:off x="10122663" y="294254"/>
+            <a:ext cx="191732" cy="191990"/>
+          </a:xfrm>
+          <a:prstGeom prst="ellipse">
+            <a:avLst/>
+          </a:prstGeom>
+          <a:solidFill>
+            <a:srgbClr val="FFFF00"/>
+          </a:solidFill>
+          <a:ln w="12700">
+            <a:solidFill>
+              <a:schemeClr val="accent3"/>
+            </a:solidFill>
+          </a:ln>
+        </p:spPr>
+        <p:style>
+          <a:lnRef idx="2">
+            <a:schemeClr val="accent1">
+              <a:shade val="50000"/>
+            </a:schemeClr>
+          </a:lnRef>
+          <a:fillRef idx="1">
+            <a:schemeClr val="accent1"/>
+          </a:fillRef>
+          <a:effectRef idx="0">
+            <a:schemeClr val="accent1"/>
+          </a:effectRef>
+          <a:fontRef idx="minor">
+            <a:schemeClr val="lt1"/>
+          </a:fontRef>
+        </p:style>
+        <p:txBody>
+          <a:bodyPr wrap="none" lIns="47997" tIns="47997" rIns="47997" rtlCol="0" anchor="ctr"/>
+          <a:lstStyle/>
+          <a:p>
+            <a:pPr algn="ctr" defTabSz="609555"/>
+            <a:endParaRPr lang="en-US" sz="1067" dirty="0">
+              <a:solidFill>
+                <a:prstClr val="black"/>
+              </a:solidFill>
+              <a:latin typeface="Simplon BP Regular"/>
+              <a:cs typeface="Simplon BP Regular"/>
+            </a:endParaRPr>
+          </a:p>
+        </p:txBody>
+      </p:sp>
+      <p:sp>
+        <p:nvSpPr>
+          <p:cNvPr id="46" name="TextBox 123">
+            <a:extLst>
+              <a:ext uri="{FF2B5EF4-FFF2-40B4-BE49-F238E27FC236}">
+                <a16:creationId xmlns:a16="http://schemas.microsoft.com/office/drawing/2014/main" id="{EDE9EB13-C574-4D80-85B2-C614186377BB}"/>
+              </a:ext>
+            </a:extLst>
+          </p:cNvPr>
+          <p:cNvSpPr txBox="1"/>
+          <p:nvPr/>
+        </p:nvSpPr>
+        <p:spPr>
+          <a:xfrm>
+            <a:off x="9830866" y="577728"/>
+            <a:ext cx="815957" cy="163090"/>
+          </a:xfrm>
+          <a:prstGeom prst="rect">
+            <a:avLst/>
+          </a:prstGeom>
+          <a:noFill/>
+          <a:ln w="12700">
+            <a:noFill/>
+          </a:ln>
+        </p:spPr>
+        <p:style>
+          <a:lnRef idx="2">
+            <a:schemeClr val="accent4"/>
+          </a:lnRef>
+          <a:fillRef idx="1">
+            <a:schemeClr val="lt1"/>
+          </a:fillRef>
+          <a:effectRef idx="0">
+            <a:schemeClr val="accent4"/>
+          </a:effectRef>
+          <a:fontRef idx="minor">
+            <a:schemeClr val="dk1"/>
+          </a:fontRef>
+        </p:style>
+        <p:txBody>
+          <a:bodyPr wrap="none" lIns="47997" tIns="47997" rIns="47997" bIns="0" rtlCol="0" anchor="b"/>
+          <a:lstStyle>
+            <a:defPPr>
+              <a:defRPr lang="en-US"/>
+            </a:defPPr>
+            <a:lvl1pPr algn="ctr">
+              <a:defRPr sz="1000" b="1">
+                <a:latin typeface="Simplon BP Regular"/>
+                <a:cs typeface="Simplon BP Regular"/>
+              </a:defRPr>
+            </a:lvl1pPr>
+            <a:lvl2pPr>
+              <a:defRPr>
+                <a:solidFill>
+                  <a:schemeClr val="dk1"/>
+                </a:solidFill>
+              </a:defRPr>
+            </a:lvl2pPr>
+            <a:lvl3pPr>
+              <a:defRPr>
+                <a:solidFill>
+                  <a:schemeClr val="dk1"/>
+                </a:solidFill>
+              </a:defRPr>
+            </a:lvl3pPr>
+            <a:lvl4pPr>
+              <a:defRPr>
+                <a:solidFill>
+                  <a:schemeClr val="dk1"/>
+                </a:solidFill>
+              </a:defRPr>
+            </a:lvl4pPr>
+            <a:lvl5pPr>
+              <a:defRPr>
+                <a:solidFill>
+                  <a:schemeClr val="dk1"/>
+                </a:solidFill>
+              </a:defRPr>
+            </a:lvl5pPr>
+            <a:lvl6pPr>
+              <a:defRPr>
+                <a:solidFill>
+                  <a:schemeClr val="dk1"/>
+                </a:solidFill>
+              </a:defRPr>
+            </a:lvl6pPr>
+            <a:lvl7pPr>
+              <a:defRPr>
+                <a:solidFill>
+                  <a:schemeClr val="dk1"/>
+                </a:solidFill>
+              </a:defRPr>
+            </a:lvl7pPr>
+            <a:lvl8pPr>
+              <a:defRPr>
+                <a:solidFill>
+                  <a:schemeClr val="dk1"/>
+                </a:solidFill>
+              </a:defRPr>
+            </a:lvl8pPr>
+            <a:lvl9pPr>
+              <a:defRPr>
+                <a:solidFill>
+                  <a:schemeClr val="dk1"/>
+                </a:solidFill>
+              </a:defRPr>
+            </a:lvl9pPr>
+          </a:lstStyle>
+          <a:p>
+            <a:pPr defTabSz="609555"/>
+            <a:r>
+              <a:rPr lang="pt-BR" sz="1067" b="0" dirty="0">
+                <a:solidFill>
+                  <a:prstClr val="black"/>
+                </a:solidFill>
+                <a:latin typeface="Simplon BP Bold" pitchFamily="2" charset="0"/>
+              </a:rPr>
+              <a:t>Plataforma</a:t>
+            </a:r>
+          </a:p>
+        </p:txBody>
+      </p:sp>
+      <p:sp>
+        <p:nvSpPr>
+          <p:cNvPr id="47" name="TextBox 128">
+            <a:extLst>
+              <a:ext uri="{FF2B5EF4-FFF2-40B4-BE49-F238E27FC236}">
+                <a16:creationId xmlns:a16="http://schemas.microsoft.com/office/drawing/2014/main" id="{9C8F333D-81A1-4BAB-89AC-459C19DD7185}"/>
+              </a:ext>
+            </a:extLst>
+          </p:cNvPr>
+          <p:cNvSpPr txBox="1"/>
+          <p:nvPr/>
+        </p:nvSpPr>
+        <p:spPr>
+          <a:xfrm>
+            <a:off x="9100132" y="555483"/>
+            <a:ext cx="549346" cy="181624"/>
+          </a:xfrm>
+          <a:prstGeom prst="rect">
+            <a:avLst/>
+          </a:prstGeom>
+          <a:noFill/>
+          <a:ln w="12700">
+            <a:noFill/>
+          </a:ln>
+        </p:spPr>
+        <p:style>
+          <a:lnRef idx="2">
+            <a:schemeClr val="accent4"/>
+          </a:lnRef>
+          <a:fillRef idx="1">
+            <a:schemeClr val="lt1"/>
+          </a:fillRef>
+          <a:effectRef idx="0">
+            <a:schemeClr val="accent4"/>
+          </a:effectRef>
+          <a:fontRef idx="minor">
+            <a:schemeClr val="dk1"/>
+          </a:fontRef>
+        </p:style>
+        <p:txBody>
+          <a:bodyPr wrap="none" lIns="47997" tIns="47997" rIns="47997" bIns="0" rtlCol="0" anchor="b"/>
+          <a:lstStyle>
+            <a:defPPr>
+              <a:defRPr lang="en-US"/>
+            </a:defPPr>
+            <a:lvl1pPr algn="ctr">
+              <a:defRPr sz="1000" b="1">
+                <a:latin typeface="Simplon BP Regular"/>
+                <a:cs typeface="Simplon BP Regular"/>
+              </a:defRPr>
+            </a:lvl1pPr>
+            <a:lvl2pPr>
+              <a:defRPr>
+                <a:solidFill>
+                  <a:schemeClr val="dk1"/>
+                </a:solidFill>
+              </a:defRPr>
+            </a:lvl2pPr>
+            <a:lvl3pPr>
+              <a:defRPr>
+                <a:solidFill>
+                  <a:schemeClr val="dk1"/>
+                </a:solidFill>
+              </a:defRPr>
+            </a:lvl3pPr>
+            <a:lvl4pPr>
+              <a:defRPr>
+                <a:solidFill>
+                  <a:schemeClr val="dk1"/>
+                </a:solidFill>
+              </a:defRPr>
+            </a:lvl4pPr>
+            <a:lvl5pPr>
+              <a:defRPr>
+                <a:solidFill>
+                  <a:schemeClr val="dk1"/>
+                </a:solidFill>
+              </a:defRPr>
+            </a:lvl5pPr>
+            <a:lvl6pPr>
+              <a:defRPr>
+                <a:solidFill>
+                  <a:schemeClr val="dk1"/>
+                </a:solidFill>
+              </a:defRPr>
+            </a:lvl6pPr>
+            <a:lvl7pPr>
+              <a:defRPr>
+                <a:solidFill>
+                  <a:schemeClr val="dk1"/>
+                </a:solidFill>
+              </a:defRPr>
+            </a:lvl7pPr>
+            <a:lvl8pPr>
+              <a:defRPr>
+                <a:solidFill>
+                  <a:schemeClr val="dk1"/>
+                </a:solidFill>
+              </a:defRPr>
+            </a:lvl8pPr>
+            <a:lvl9pPr>
+              <a:defRPr>
+                <a:solidFill>
+                  <a:schemeClr val="dk1"/>
+                </a:solidFill>
+              </a:defRPr>
+            </a:lvl9pPr>
+          </a:lstStyle>
+          <a:p>
+            <a:pPr defTabSz="609555"/>
+            <a:r>
+              <a:rPr lang="pt-BR" sz="1067" b="0" dirty="0">
+                <a:solidFill>
+                  <a:prstClr val="black"/>
+                </a:solidFill>
+                <a:latin typeface="Simplon BP Bold" pitchFamily="2" charset="0"/>
+              </a:rPr>
+              <a:t>Back</a:t>
+            </a:r>
+          </a:p>
+        </p:txBody>
+      </p:sp>
+      <p:sp>
+        <p:nvSpPr>
+          <p:cNvPr id="48" name="TextBox 133">
+            <a:extLst>
+              <a:ext uri="{FF2B5EF4-FFF2-40B4-BE49-F238E27FC236}">
+                <a16:creationId xmlns:a16="http://schemas.microsoft.com/office/drawing/2014/main" id="{64DC5C74-7B23-4BE5-BE63-A9BD52C02CD4}"/>
+              </a:ext>
+            </a:extLst>
+          </p:cNvPr>
+          <p:cNvSpPr txBox="1"/>
+          <p:nvPr/>
+        </p:nvSpPr>
+        <p:spPr>
+          <a:xfrm>
+            <a:off x="8121289" y="554815"/>
+            <a:ext cx="815957" cy="163090"/>
+          </a:xfrm>
+          <a:prstGeom prst="rect">
+            <a:avLst/>
+          </a:prstGeom>
+          <a:noFill/>
+          <a:ln w="12700">
+            <a:noFill/>
+          </a:ln>
+        </p:spPr>
+        <p:style>
+          <a:lnRef idx="2">
+            <a:schemeClr val="accent4"/>
+          </a:lnRef>
+          <a:fillRef idx="1">
+            <a:schemeClr val="lt1"/>
+          </a:fillRef>
+          <a:effectRef idx="0">
+            <a:schemeClr val="accent4"/>
+          </a:effectRef>
+          <a:fontRef idx="minor">
+            <a:schemeClr val="dk1"/>
+          </a:fontRef>
+        </p:style>
+        <p:txBody>
+          <a:bodyPr wrap="none" lIns="47997" tIns="47997" rIns="47997" bIns="0" rtlCol="0" anchor="b"/>
+          <a:lstStyle>
+            <a:defPPr>
+              <a:defRPr lang="en-US"/>
+            </a:defPPr>
+            <a:lvl1pPr algn="ctr">
+              <a:defRPr sz="1000" b="1">
+                <a:latin typeface="Simplon BP Regular"/>
+                <a:cs typeface="Simplon BP Regular"/>
+              </a:defRPr>
+            </a:lvl1pPr>
+            <a:lvl2pPr>
+              <a:defRPr>
+                <a:solidFill>
+                  <a:schemeClr val="dk1"/>
+                </a:solidFill>
+              </a:defRPr>
+            </a:lvl2pPr>
+            <a:lvl3pPr>
+              <a:defRPr>
+                <a:solidFill>
+                  <a:schemeClr val="dk1"/>
+                </a:solidFill>
+              </a:defRPr>
+            </a:lvl3pPr>
+            <a:lvl4pPr>
+              <a:defRPr>
+                <a:solidFill>
+                  <a:schemeClr val="dk1"/>
+                </a:solidFill>
+              </a:defRPr>
+            </a:lvl4pPr>
+            <a:lvl5pPr>
+              <a:defRPr>
+                <a:solidFill>
+                  <a:schemeClr val="dk1"/>
+                </a:solidFill>
+              </a:defRPr>
+            </a:lvl5pPr>
+            <a:lvl6pPr>
+              <a:defRPr>
+                <a:solidFill>
+                  <a:schemeClr val="dk1"/>
+                </a:solidFill>
+              </a:defRPr>
+            </a:lvl6pPr>
+            <a:lvl7pPr>
+              <a:defRPr>
+                <a:solidFill>
+                  <a:schemeClr val="dk1"/>
+                </a:solidFill>
+              </a:defRPr>
+            </a:lvl7pPr>
+            <a:lvl8pPr>
+              <a:defRPr>
+                <a:solidFill>
+                  <a:schemeClr val="dk1"/>
+                </a:solidFill>
+              </a:defRPr>
+            </a:lvl8pPr>
+            <a:lvl9pPr>
+              <a:defRPr>
+                <a:solidFill>
+                  <a:schemeClr val="dk1"/>
+                </a:solidFill>
+              </a:defRPr>
+            </a:lvl9pPr>
+          </a:lstStyle>
+          <a:p>
+            <a:pPr defTabSz="609555"/>
+            <a:r>
+              <a:rPr lang="pt-BR" sz="1067" b="0" dirty="0">
+                <a:solidFill>
+                  <a:prstClr val="black"/>
+                </a:solidFill>
+                <a:latin typeface="Simplon BP Bold" pitchFamily="2" charset="0"/>
+              </a:rPr>
+              <a:t>Front</a:t>
+            </a:r>
+          </a:p>
+        </p:txBody>
+      </p:sp>
+      <p:sp>
+        <p:nvSpPr>
+          <p:cNvPr id="49" name="Oval 134">
+            <a:extLst>
+              <a:ext uri="{FF2B5EF4-FFF2-40B4-BE49-F238E27FC236}">
+                <a16:creationId xmlns:a16="http://schemas.microsoft.com/office/drawing/2014/main" id="{1CBC8A27-FF05-44CD-B093-FB50D917E8D4}"/>
+              </a:ext>
+            </a:extLst>
+          </p:cNvPr>
+          <p:cNvSpPr>
+            <a:spLocks noChangeAspect="1"/>
+          </p:cNvSpPr>
+          <p:nvPr/>
+        </p:nvSpPr>
+        <p:spPr>
+          <a:xfrm>
+            <a:off x="7665269" y="294254"/>
+            <a:ext cx="191732" cy="191990"/>
+          </a:xfrm>
+          <a:prstGeom prst="ellipse">
+            <a:avLst/>
+          </a:prstGeom>
+          <a:solidFill>
+            <a:srgbClr val="1BCF13"/>
+          </a:solidFill>
+          <a:ln w="12700">
+            <a:solidFill>
+              <a:schemeClr val="accent3"/>
+            </a:solidFill>
+          </a:ln>
+        </p:spPr>
+        <p:style>
+          <a:lnRef idx="2">
+            <a:schemeClr val="accent1">
+              <a:shade val="50000"/>
+            </a:schemeClr>
+          </a:lnRef>
+          <a:fillRef idx="1">
+            <a:schemeClr val="accent1"/>
+          </a:fillRef>
+          <a:effectRef idx="0">
+            <a:schemeClr val="accent1"/>
+          </a:effectRef>
+          <a:fontRef idx="minor">
+            <a:schemeClr val="lt1"/>
+          </a:fontRef>
+        </p:style>
+        <p:txBody>
+          <a:bodyPr wrap="none" lIns="47997" tIns="47997" rIns="47997" rtlCol="0" anchor="ctr"/>
+          <a:lstStyle/>
+          <a:p>
+            <a:pPr algn="ctr" defTabSz="609555"/>
+            <a:endParaRPr lang="en-US" sz="1067" dirty="0">
+              <a:solidFill>
+                <a:prstClr val="black"/>
+              </a:solidFill>
+              <a:latin typeface="Simplon BP Regular"/>
+              <a:cs typeface="Simplon BP Regular"/>
+            </a:endParaRPr>
+          </a:p>
+        </p:txBody>
+      </p:sp>
+      <p:sp>
+        <p:nvSpPr>
+          <p:cNvPr id="50" name="TextBox 138">
+            <a:extLst>
+              <a:ext uri="{FF2B5EF4-FFF2-40B4-BE49-F238E27FC236}">
+                <a16:creationId xmlns:a16="http://schemas.microsoft.com/office/drawing/2014/main" id="{B1654790-CBD3-4D97-B9BC-CBC39DD32FC8}"/>
+              </a:ext>
+            </a:extLst>
+          </p:cNvPr>
+          <p:cNvSpPr txBox="1"/>
+          <p:nvPr/>
+        </p:nvSpPr>
+        <p:spPr>
+          <a:xfrm>
+            <a:off x="7379674" y="555483"/>
+            <a:ext cx="815957" cy="163090"/>
+          </a:xfrm>
+          <a:prstGeom prst="rect">
+            <a:avLst/>
+          </a:prstGeom>
+          <a:noFill/>
+          <a:ln w="12700">
+            <a:noFill/>
+          </a:ln>
+        </p:spPr>
+        <p:style>
+          <a:lnRef idx="2">
+            <a:schemeClr val="accent4"/>
+          </a:lnRef>
+          <a:fillRef idx="1">
+            <a:schemeClr val="lt1"/>
+          </a:fillRef>
+          <a:effectRef idx="0">
+            <a:schemeClr val="accent4"/>
+          </a:effectRef>
+          <a:fontRef idx="minor">
+            <a:schemeClr val="dk1"/>
+          </a:fontRef>
+        </p:style>
+        <p:txBody>
+          <a:bodyPr wrap="none" lIns="47997" tIns="47997" rIns="47997" bIns="0" rtlCol="0" anchor="b"/>
+          <a:lstStyle>
+            <a:defPPr>
+              <a:defRPr lang="en-US"/>
+            </a:defPPr>
+            <a:lvl1pPr algn="ctr">
+              <a:defRPr sz="1000" b="1">
+                <a:latin typeface="Simplon BP Regular"/>
+                <a:cs typeface="Simplon BP Regular"/>
+              </a:defRPr>
+            </a:lvl1pPr>
+            <a:lvl2pPr>
+              <a:defRPr>
+                <a:solidFill>
+                  <a:schemeClr val="dk1"/>
+                </a:solidFill>
+              </a:defRPr>
+            </a:lvl2pPr>
+            <a:lvl3pPr>
+              <a:defRPr>
+                <a:solidFill>
+                  <a:schemeClr val="dk1"/>
+                </a:solidFill>
+              </a:defRPr>
+            </a:lvl3pPr>
+            <a:lvl4pPr>
+              <a:defRPr>
+                <a:solidFill>
+                  <a:schemeClr val="dk1"/>
+                </a:solidFill>
+              </a:defRPr>
+            </a:lvl4pPr>
+            <a:lvl5pPr>
+              <a:defRPr>
+                <a:solidFill>
+                  <a:schemeClr val="dk1"/>
+                </a:solidFill>
+              </a:defRPr>
+            </a:lvl5pPr>
+            <a:lvl6pPr>
+              <a:defRPr>
+                <a:solidFill>
+                  <a:schemeClr val="dk1"/>
+                </a:solidFill>
+              </a:defRPr>
+            </a:lvl6pPr>
+            <a:lvl7pPr>
+              <a:defRPr>
+                <a:solidFill>
+                  <a:schemeClr val="dk1"/>
+                </a:solidFill>
+              </a:defRPr>
+            </a:lvl7pPr>
+            <a:lvl8pPr>
+              <a:defRPr>
+                <a:solidFill>
+                  <a:schemeClr val="dk1"/>
+                </a:solidFill>
+              </a:defRPr>
+            </a:lvl8pPr>
+            <a:lvl9pPr>
+              <a:defRPr>
+                <a:solidFill>
+                  <a:schemeClr val="dk1"/>
+                </a:solidFill>
+              </a:defRPr>
+            </a:lvl9pPr>
+          </a:lstStyle>
+          <a:p>
+            <a:pPr defTabSz="609555"/>
+            <a:r>
+              <a:rPr lang="en-US" sz="1067" b="0" dirty="0">
+                <a:solidFill>
+                  <a:prstClr val="black"/>
+                </a:solidFill>
+                <a:latin typeface="Simplon BP Bold" pitchFamily="2" charset="0"/>
+              </a:rPr>
+              <a:t>Equipe</a:t>
+            </a:r>
+          </a:p>
+        </p:txBody>
+      </p:sp>
+      <p:sp>
+        <p:nvSpPr>
+          <p:cNvPr id="51" name="Oval 134">
+            <a:extLst>
+              <a:ext uri="{FF2B5EF4-FFF2-40B4-BE49-F238E27FC236}">
+                <a16:creationId xmlns:a16="http://schemas.microsoft.com/office/drawing/2014/main" id="{508E308C-5CF8-44B6-A1C4-87E5DDC4CC70}"/>
+              </a:ext>
+            </a:extLst>
+          </p:cNvPr>
+          <p:cNvSpPr>
+            <a:spLocks noChangeAspect="1"/>
+          </p:cNvSpPr>
+          <p:nvPr/>
+        </p:nvSpPr>
+        <p:spPr>
+          <a:xfrm>
+            <a:off x="8415530" y="294254"/>
+            <a:ext cx="191732" cy="191990"/>
+          </a:xfrm>
+          <a:prstGeom prst="ellipse">
+            <a:avLst/>
+          </a:prstGeom>
+          <a:solidFill>
+            <a:srgbClr val="FFFF00"/>
+          </a:solidFill>
+          <a:ln w="12700">
+            <a:solidFill>
+              <a:schemeClr val="accent3"/>
+            </a:solidFill>
+          </a:ln>
+        </p:spPr>
+        <p:style>
+          <a:lnRef idx="2">
+            <a:schemeClr val="accent1">
+              <a:shade val="50000"/>
+            </a:schemeClr>
+          </a:lnRef>
+          <a:fillRef idx="1">
+            <a:schemeClr val="accent1"/>
+          </a:fillRef>
+          <a:effectRef idx="0">
+            <a:schemeClr val="accent1"/>
+          </a:effectRef>
+          <a:fontRef idx="minor">
+            <a:schemeClr val="lt1"/>
+          </a:fontRef>
+        </p:style>
+        <p:txBody>
+          <a:bodyPr wrap="none" lIns="47997" tIns="47997" rIns="47997" rtlCol="0" anchor="ctr"/>
+          <a:lstStyle/>
+          <a:p>
+            <a:pPr algn="ctr" defTabSz="609555"/>
+            <a:endParaRPr lang="en-US" sz="1067" dirty="0">
+              <a:solidFill>
+                <a:prstClr val="black"/>
+              </a:solidFill>
+              <a:highlight>
+                <a:srgbClr val="FFFF00"/>
+              </a:highlight>
+              <a:latin typeface="Simplon BP Regular"/>
+              <a:cs typeface="Simplon BP Regular"/>
+            </a:endParaRPr>
+          </a:p>
+        </p:txBody>
+      </p:sp>
+      <p:sp>
+        <p:nvSpPr>
+          <p:cNvPr id="52" name="Oval 134">
+            <a:extLst>
+              <a:ext uri="{FF2B5EF4-FFF2-40B4-BE49-F238E27FC236}">
+                <a16:creationId xmlns:a16="http://schemas.microsoft.com/office/drawing/2014/main" id="{7BFB1971-EC64-4AB8-B092-E0043EABF66E}"/>
+              </a:ext>
+            </a:extLst>
+          </p:cNvPr>
+          <p:cNvSpPr>
+            <a:spLocks noChangeAspect="1"/>
+          </p:cNvSpPr>
+          <p:nvPr/>
+        </p:nvSpPr>
+        <p:spPr>
+          <a:xfrm>
+            <a:off x="11034703" y="294254"/>
+            <a:ext cx="191732" cy="191990"/>
+          </a:xfrm>
+          <a:prstGeom prst="ellipse">
+            <a:avLst/>
+          </a:prstGeom>
+          <a:solidFill>
+            <a:srgbClr val="1BCF13"/>
+          </a:solidFill>
+          <a:ln w="12700">
+            <a:solidFill>
+              <a:schemeClr val="accent3"/>
+            </a:solidFill>
+          </a:ln>
+        </p:spPr>
+        <p:style>
+          <a:lnRef idx="2">
+            <a:schemeClr val="accent1">
+              <a:shade val="50000"/>
+            </a:schemeClr>
+          </a:lnRef>
+          <a:fillRef idx="1">
+            <a:schemeClr val="accent1"/>
+          </a:fillRef>
+          <a:effectRef idx="0">
+            <a:schemeClr val="accent1"/>
+          </a:effectRef>
+          <a:fontRef idx="minor">
+            <a:schemeClr val="lt1"/>
+          </a:fontRef>
+        </p:style>
+        <p:txBody>
+          <a:bodyPr wrap="none" lIns="47997" tIns="47997" rIns="47997" rtlCol="0" anchor="ctr"/>
+          <a:lstStyle/>
+          <a:p>
+            <a:pPr algn="ctr" defTabSz="609555"/>
+            <a:endParaRPr lang="en-US" sz="1067" dirty="0">
+              <a:solidFill>
+                <a:prstClr val="black"/>
+              </a:solidFill>
+              <a:latin typeface="Simplon BP Regular"/>
+              <a:cs typeface="Simplon BP Regular"/>
+            </a:endParaRPr>
+          </a:p>
+        </p:txBody>
+      </p:sp>
+      <p:sp>
+        <p:nvSpPr>
+          <p:cNvPr id="53" name="Oval 120">
+            <a:extLst>
+              <a:ext uri="{FF2B5EF4-FFF2-40B4-BE49-F238E27FC236}">
+                <a16:creationId xmlns:a16="http://schemas.microsoft.com/office/drawing/2014/main" id="{CD1D1FF9-2BFE-4742-BA82-E1804B8C0747}"/>
+              </a:ext>
+            </a:extLst>
+          </p:cNvPr>
+          <p:cNvSpPr>
+            <a:spLocks noChangeAspect="1"/>
+          </p:cNvSpPr>
+          <p:nvPr/>
+        </p:nvSpPr>
+        <p:spPr>
+          <a:xfrm>
+            <a:off x="9248326" y="294254"/>
+            <a:ext cx="191732" cy="191990"/>
+          </a:xfrm>
+          <a:prstGeom prst="ellipse">
+            <a:avLst/>
+          </a:prstGeom>
+          <a:solidFill>
+            <a:srgbClr val="FFFF00"/>
+          </a:solidFill>
+          <a:ln w="12700">
+            <a:solidFill>
+              <a:schemeClr val="accent3"/>
+            </a:solidFill>
+          </a:ln>
+        </p:spPr>
+        <p:style>
+          <a:lnRef idx="2">
+            <a:schemeClr val="accent1">
+              <a:shade val="50000"/>
+            </a:schemeClr>
+          </a:lnRef>
+          <a:fillRef idx="1">
+            <a:schemeClr val="accent1"/>
+          </a:fillRef>
+          <a:effectRef idx="0">
+            <a:schemeClr val="accent1"/>
+          </a:effectRef>
+          <a:fontRef idx="minor">
+            <a:schemeClr val="lt1"/>
+          </a:fontRef>
+        </p:style>
+        <p:txBody>
+          <a:bodyPr wrap="none" lIns="47997" tIns="47997" rIns="47997" rtlCol="0" anchor="ctr"/>
+          <a:lstStyle/>
+          <a:p>
+            <a:pPr algn="ctr" defTabSz="609555"/>
+            <a:endParaRPr lang="en-US" sz="1067" dirty="0">
+              <a:solidFill>
+                <a:srgbClr val="FF0000"/>
+              </a:solidFill>
+              <a:highlight>
+                <a:srgbClr val="FFFF00"/>
+              </a:highlight>
+              <a:latin typeface="Simplon BP Regular"/>
+              <a:cs typeface="Simplon BP Regular"/>
+            </a:endParaRPr>
+          </a:p>
+        </p:txBody>
+      </p:sp>
+      <p:sp>
+        <p:nvSpPr>
+          <p:cNvPr id="54" name="Retângulo 53">
+            <a:extLst>
+              <a:ext uri="{FF2B5EF4-FFF2-40B4-BE49-F238E27FC236}">
+                <a16:creationId xmlns:a16="http://schemas.microsoft.com/office/drawing/2014/main" id="{1B63957F-A46D-48D5-BC08-1A2EB1CCBBE4}"/>
+              </a:ext>
+            </a:extLst>
+          </p:cNvPr>
+          <p:cNvSpPr/>
+          <p:nvPr/>
+        </p:nvSpPr>
+        <p:spPr>
+          <a:xfrm>
+            <a:off x="7271530" y="163640"/>
+            <a:ext cx="4478206" cy="561189"/>
+          </a:xfrm>
+          <a:prstGeom prst="rect">
+            <a:avLst/>
+          </a:prstGeom>
+          <a:noFill/>
+          <a:ln w="6350">
+            <a:solidFill>
+              <a:schemeClr val="bg1">
+                <a:lumMod val="75000"/>
+              </a:schemeClr>
+            </a:solidFill>
+          </a:ln>
+        </p:spPr>
+        <p:style>
+          <a:lnRef idx="2">
+            <a:schemeClr val="accent1">
+              <a:shade val="50000"/>
+            </a:schemeClr>
+          </a:lnRef>
+          <a:fillRef idx="1">
+            <a:schemeClr val="accent1"/>
+          </a:fillRef>
+          <a:effectRef idx="0">
+            <a:schemeClr val="accent1"/>
+          </a:effectRef>
+          <a:fontRef idx="minor">
+            <a:schemeClr val="lt1"/>
+          </a:fontRef>
+        </p:style>
+        <p:txBody>
+          <a:bodyPr rtlCol="0" anchor="ctr"/>
+          <a:lstStyle/>
+          <a:p>
+            <a:pPr algn="ctr"/>
+            <a:endParaRPr lang="pt-BR" sz="1632"/>
+          </a:p>
+        </p:txBody>
+      </p:sp>
+      <p:sp>
+        <p:nvSpPr>
+          <p:cNvPr id="55" name="TextBox 138">
+            <a:extLst>
+              <a:ext uri="{FF2B5EF4-FFF2-40B4-BE49-F238E27FC236}">
+                <a16:creationId xmlns:a16="http://schemas.microsoft.com/office/drawing/2014/main" id="{F371B3E2-E59C-4A0F-B5AC-74687E6B4AC8}"/>
+              </a:ext>
+            </a:extLst>
+          </p:cNvPr>
+          <p:cNvSpPr txBox="1"/>
+          <p:nvPr/>
+        </p:nvSpPr>
+        <p:spPr>
+          <a:xfrm>
+            <a:off x="8811693" y="46951"/>
+            <a:ext cx="1340543" cy="191989"/>
+          </a:xfrm>
+          <a:prstGeom prst="rect">
+            <a:avLst/>
+          </a:prstGeom>
+          <a:solidFill>
+            <a:schemeClr val="bg1"/>
+          </a:solidFill>
+          <a:ln w="12700">
+            <a:noFill/>
+          </a:ln>
+        </p:spPr>
+        <p:style>
+          <a:lnRef idx="2">
+            <a:schemeClr val="accent4"/>
+          </a:lnRef>
+          <a:fillRef idx="1">
+            <a:schemeClr val="lt1"/>
+          </a:fillRef>
+          <a:effectRef idx="0">
+            <a:schemeClr val="accent4"/>
+          </a:effectRef>
+          <a:fontRef idx="minor">
+            <a:schemeClr val="dk1"/>
+          </a:fontRef>
+        </p:style>
+        <p:txBody>
+          <a:bodyPr wrap="none" lIns="47997" tIns="47997" rIns="47997" bIns="0" rtlCol="0" anchor="b"/>
+          <a:lstStyle>
+            <a:defPPr>
+              <a:defRPr lang="en-US"/>
+            </a:defPPr>
+            <a:lvl1pPr algn="ctr">
+              <a:defRPr sz="1000" b="1">
+                <a:latin typeface="Simplon BP Regular"/>
+                <a:cs typeface="Simplon BP Regular"/>
+              </a:defRPr>
+            </a:lvl1pPr>
+            <a:lvl2pPr>
+              <a:defRPr>
+                <a:solidFill>
+                  <a:schemeClr val="dk1"/>
+                </a:solidFill>
+              </a:defRPr>
+            </a:lvl2pPr>
+            <a:lvl3pPr>
+              <a:defRPr>
+                <a:solidFill>
+                  <a:schemeClr val="dk1"/>
+                </a:solidFill>
+              </a:defRPr>
+            </a:lvl3pPr>
+            <a:lvl4pPr>
+              <a:defRPr>
+                <a:solidFill>
+                  <a:schemeClr val="dk1"/>
+                </a:solidFill>
+              </a:defRPr>
+            </a:lvl4pPr>
+            <a:lvl5pPr>
+              <a:defRPr>
+                <a:solidFill>
+                  <a:schemeClr val="dk1"/>
+                </a:solidFill>
+              </a:defRPr>
+            </a:lvl5pPr>
+            <a:lvl6pPr>
+              <a:defRPr>
+                <a:solidFill>
+                  <a:schemeClr val="dk1"/>
+                </a:solidFill>
+              </a:defRPr>
+            </a:lvl6pPr>
+            <a:lvl7pPr>
+              <a:defRPr>
+                <a:solidFill>
+                  <a:schemeClr val="dk1"/>
+                </a:solidFill>
+              </a:defRPr>
+            </a:lvl7pPr>
+            <a:lvl8pPr>
+              <a:defRPr>
+                <a:solidFill>
+                  <a:schemeClr val="dk1"/>
+                </a:solidFill>
+              </a:defRPr>
+            </a:lvl8pPr>
+            <a:lvl9pPr>
+              <a:defRPr>
+                <a:solidFill>
+                  <a:schemeClr val="dk1"/>
+                </a:solidFill>
+              </a:defRPr>
+            </a:lvl9pPr>
+          </a:lstStyle>
+          <a:p>
+            <a:pPr defTabSz="609555"/>
+            <a:r>
+              <a:rPr lang="en-US" sz="1067" b="0" dirty="0">
+                <a:solidFill>
+                  <a:prstClr val="black"/>
+                </a:solidFill>
+                <a:latin typeface="Simplon BP Bold" pitchFamily="2" charset="0"/>
+              </a:rPr>
+              <a:t>    Farol do Projeto   </a:t>
+            </a:r>
+          </a:p>
+        </p:txBody>
+      </p:sp>
+    </p:spTree>
+    <p:extLst>
+      <p:ext uri="{BB962C8B-B14F-4D97-AF65-F5344CB8AC3E}">
+        <p14:creationId xmlns:p14="http://schemas.microsoft.com/office/powerpoint/2010/main" val="1617750086"/>
+      </p:ext>
+    </p:extLst>
+  </p:cSld>
+  <p:clrMapOvr>
+    <a:masterClrMapping/>
+  </p:clrMapOvr>
+</p:sld>
+</file>
+
 <file path=ppt/theme/theme1.xml><?xml version="1.0" encoding="utf-8"?>
 <a:theme xmlns:a="http://schemas.openxmlformats.org/drawingml/2006/main" name="Personalizar design">
   <a:themeElements>

</xml_diff>